<commit_message>
Added logic to test without database, nearly done but i have some errors.
</commit_message>
<xml_diff>
--- a/BankingPresentation.pptx
+++ b/BankingPresentation.pptx
@@ -105,6 +105,11 @@
       </a:defRPr>
     </a:lvl9pPr>
   </p:defaultTextStyle>
+  <p:extLst>
+    <p:ext uri="{EFAFB233-063F-42B5-8137-9DF3F51BA10A}">
+      <p15:sldGuideLst xmlns:p15="http://schemas.microsoft.com/office/powerpoint/2012/main"/>
+    </p:ext>
+  </p:extLst>
 </p:presentation>
 </file>
 
@@ -203,7 +208,7 @@
           <a:effectLst/>
           <a:extLst>
             <a:ext uri="{91240B29-F687-4f45-9708-019B960494DF}">
-              <a14:hiddenLine xmlns:a14="http://schemas.microsoft.com/office/drawing/2010/main" xmlns="" w="9525">
+              <a14:hiddenLine xmlns="" xmlns:a14="http://schemas.microsoft.com/office/drawing/2010/main" w="9525">
                 <a:solidFill>
                   <a:srgbClr val="000000"/>
                 </a:solidFill>
@@ -396,7 +401,7 @@
             <a:fld id="{08B9EBBA-996F-894A-B54A-D6246ED52CEA}" type="datetimeFigureOut">
               <a:rPr lang="en-US" dirty="0"/>
               <a:pPr/>
-              <a:t>7/29/22</a:t>
+              <a:t>7/31/22</a:t>
             </a:fld>
             <a:endParaRPr lang="en-US" dirty="0"/>
           </a:p>
@@ -711,7 +716,7 @@
             <a:fld id="{18C79C5D-2A6F-F04D-97DA-BEF2467B64E4}" type="datetimeFigureOut">
               <a:rPr lang="en-US" dirty="0"/>
               <a:pPr/>
-              <a:t>7/29/22</a:t>
+              <a:t>7/31/22</a:t>
             </a:fld>
             <a:endParaRPr lang="en-US" dirty="0"/>
           </a:p>
@@ -1196,7 +1201,7 @@
             <a:fld id="{8DFA1846-DA80-1C48-A609-854EA85C59AD}" type="datetimeFigureOut">
               <a:rPr lang="en-US" dirty="0"/>
               <a:pPr/>
-              <a:t>7/29/22</a:t>
+              <a:t>7/31/22</a:t>
             </a:fld>
             <a:endParaRPr lang="en-US" dirty="0"/>
           </a:p>
@@ -1562,7 +1567,7 @@
             <a:fld id="{FBF54567-0DE4-3F47-BF90-CB84690072F9}" type="datetimeFigureOut">
               <a:rPr lang="en-US" dirty="0"/>
               <a:pPr/>
-              <a:t>7/29/22</a:t>
+              <a:t>7/31/22</a:t>
             </a:fld>
             <a:endParaRPr lang="en-US" dirty="0"/>
           </a:p>
@@ -1713,7 +1718,7 @@
           <a:ln/>
           <a:extLst>
             <a:ext uri="{91240B29-F687-4f45-9708-019B960494DF}">
-              <a14:hiddenLine xmlns:a14="http://schemas.microsoft.com/office/drawing/2010/main" xmlns="" w="9525">
+              <a14:hiddenLine xmlns="" xmlns:a14="http://schemas.microsoft.com/office/drawing/2010/main" w="9525">
                 <a:solidFill>
                   <a:srgbClr val="000000"/>
                 </a:solidFill>
@@ -1832,7 +1837,7 @@
             <a:fld id="{C6C52C72-DE31-F449-A4ED-4C594FD91407}" type="datetimeFigureOut">
               <a:rPr lang="en-US" dirty="0"/>
               <a:pPr/>
-              <a:t>7/29/22</a:t>
+              <a:t>7/31/22</a:t>
             </a:fld>
             <a:endParaRPr lang="en-US" dirty="0"/>
           </a:p>
@@ -1985,7 +1990,7 @@
           <a:ln/>
           <a:extLst>
             <a:ext uri="{91240B29-F687-4f45-9708-019B960494DF}">
-              <a14:hiddenLine xmlns:a14="http://schemas.microsoft.com/office/drawing/2010/main" xmlns="" w="9525">
+              <a14:hiddenLine xmlns="" xmlns:a14="http://schemas.microsoft.com/office/drawing/2010/main" w="9525">
                 <a:solidFill>
                   <a:srgbClr val="000000"/>
                 </a:solidFill>
@@ -2114,7 +2119,7 @@
             <a:fld id="{ED62726E-379B-B349-9EED-81ED093FA806}" type="datetimeFigureOut">
               <a:rPr lang="en-US" dirty="0"/>
               <a:pPr/>
-              <a:t>7/29/22</a:t>
+              <a:t>7/31/22</a:t>
             </a:fld>
             <a:endParaRPr lang="en-US" dirty="0"/>
           </a:p>
@@ -2265,7 +2270,7 @@
           <a:ln/>
           <a:extLst>
             <a:ext uri="{91240B29-F687-4f45-9708-019B960494DF}">
-              <a14:hiddenLine xmlns:a14="http://schemas.microsoft.com/office/drawing/2010/main" xmlns="" w="9525">
+              <a14:hiddenLine xmlns="" xmlns:a14="http://schemas.microsoft.com/office/drawing/2010/main" w="9525">
                 <a:solidFill>
                   <a:srgbClr val="000000"/>
                 </a:solidFill>
@@ -2394,7 +2399,7 @@
             <a:fld id="{9B3A1323-8D79-1946-B0D7-40001CF92E9D}" type="datetimeFigureOut">
               <a:rPr lang="en-US" dirty="0"/>
               <a:pPr/>
-              <a:t>7/29/22</a:t>
+              <a:t>7/31/22</a:t>
             </a:fld>
             <a:endParaRPr lang="en-US" dirty="0"/>
           </a:p>
@@ -2734,7 +2739,7 @@
             <a:fld id="{8DFA1846-DA80-1C48-A609-854EA85C59AD}" type="datetimeFigureOut">
               <a:rPr lang="en-US" dirty="0"/>
               <a:pPr/>
-              <a:t>7/29/22</a:t>
+              <a:t>7/31/22</a:t>
             </a:fld>
             <a:endParaRPr lang="en-US" dirty="0"/>
           </a:p>
@@ -2885,7 +2890,7 @@
           <a:ln/>
           <a:extLst>
             <a:ext uri="{91240B29-F687-4f45-9708-019B960494DF}">
-              <a14:hiddenLine xmlns:a14="http://schemas.microsoft.com/office/drawing/2010/main" xmlns="" w="9525">
+              <a14:hiddenLine xmlns="" xmlns:a14="http://schemas.microsoft.com/office/drawing/2010/main" w="9525">
                 <a:solidFill>
                   <a:srgbClr val="000000"/>
                 </a:solidFill>
@@ -3070,7 +3075,7 @@
             <a:fld id="{57302355-E14B-8545-A8F8-0FE83CC9D524}" type="datetimeFigureOut">
               <a:rPr lang="en-US" dirty="0"/>
               <a:pPr/>
-              <a:t>7/29/22</a:t>
+              <a:t>7/31/22</a:t>
             </a:fld>
             <a:endParaRPr lang="en-US" dirty="0"/>
           </a:p>
@@ -3221,7 +3226,7 @@
           <a:ln/>
           <a:extLst>
             <a:ext uri="{91240B29-F687-4f45-9708-019B960494DF}">
-              <a14:hiddenLine xmlns:a14="http://schemas.microsoft.com/office/drawing/2010/main" xmlns="" w="9525">
+              <a14:hiddenLine xmlns="" xmlns:a14="http://schemas.microsoft.com/office/drawing/2010/main" w="9525">
                 <a:solidFill>
                   <a:srgbClr val="000000"/>
                 </a:solidFill>
@@ -3544,7 +3549,7 @@
             <a:fld id="{02640F58-564D-2B4F-AE67-E407BA4FCF45}" type="datetimeFigureOut">
               <a:rPr lang="en-US" dirty="0"/>
               <a:pPr/>
-              <a:t>7/29/22</a:t>
+              <a:t>7/31/22</a:t>
             </a:fld>
             <a:endParaRPr lang="en-US" dirty="0"/>
           </a:p>
@@ -3695,7 +3700,7 @@
           <a:ln/>
           <a:extLst>
             <a:ext uri="{91240B29-F687-4f45-9708-019B960494DF}">
-              <a14:hiddenLine xmlns:a14="http://schemas.microsoft.com/office/drawing/2010/main" xmlns="" w="9525">
+              <a14:hiddenLine xmlns="" xmlns:a14="http://schemas.microsoft.com/office/drawing/2010/main" w="9525">
                 <a:solidFill>
                   <a:srgbClr val="000000"/>
                 </a:solidFill>
@@ -3762,7 +3767,7 @@
             <a:fld id="{F13A34C8-038E-2045-AF43-DF7DBB8E0E9E}" type="datetimeFigureOut">
               <a:rPr lang="en-US" dirty="0"/>
               <a:pPr/>
-              <a:t>7/29/22</a:t>
+              <a:t>7/31/22</a:t>
             </a:fld>
             <a:endParaRPr lang="en-US" dirty="0"/>
           </a:p>
@@ -3854,7 +3859,7 @@
             <a:fld id="{8818C68F-D26B-8F47-958C-23B49CF8A634}" type="datetimeFigureOut">
               <a:rPr lang="en-US" dirty="0"/>
               <a:pPr/>
-              <a:t>7/29/22</a:t>
+              <a:t>7/31/22</a:t>
             </a:fld>
             <a:endParaRPr lang="en-US" dirty="0"/>
           </a:p>
@@ -4118,7 +4123,7 @@
           <a:ln/>
           <a:extLst>
             <a:ext uri="{91240B29-F687-4f45-9708-019B960494DF}">
-              <a14:hiddenLine xmlns:a14="http://schemas.microsoft.com/office/drawing/2010/main" xmlns="" w="9525">
+              <a14:hiddenLine xmlns="" xmlns:a14="http://schemas.microsoft.com/office/drawing/2010/main" w="9525">
                 <a:solidFill>
                   <a:srgbClr val="000000"/>
                 </a:solidFill>
@@ -4318,7 +4323,7 @@
             <a:fld id="{D0DF5E60-9974-AC48-9591-99C2BB44B7CF}" type="datetimeFigureOut">
               <a:rPr lang="en-US" dirty="0"/>
               <a:pPr/>
-              <a:t>7/29/22</a:t>
+              <a:t>7/31/22</a:t>
             </a:fld>
             <a:endParaRPr lang="en-US" dirty="0"/>
           </a:p>
@@ -4628,7 +4633,7 @@
             <a:fld id="{18C79C5D-2A6F-F04D-97DA-BEF2467B64E4}" type="datetimeFigureOut">
               <a:rPr lang="en-US" dirty="0"/>
               <a:pPr/>
-              <a:t>7/29/22</a:t>
+              <a:t>7/31/22</a:t>
             </a:fld>
             <a:endParaRPr lang="en-US" dirty="0"/>
           </a:p>
@@ -4895,7 +4900,7 @@
             <a:fld id="{09B482E8-6E0E-1B4F-B1FD-C69DB9E858D9}" type="datetimeFigureOut">
               <a:rPr lang="en-US" dirty="0"/>
               <a:pPr/>
-              <a:t>7/29/22</a:t>
+              <a:t>7/31/22</a:t>
             </a:fld>
             <a:endParaRPr lang="en-US" dirty="0"/>
           </a:p>
@@ -5364,7 +5369,11 @@
           <a:p>
             <a:r>
               <a:rPr lang="en-US" dirty="0" err="1"/>
-              <a:t>WannaBeBank</a:t>
+              <a:t>Wanna</a:t>
+            </a:r>
+            <a:r>
+              <a:rPr lang="en-US"/>
+              <a:t> Be Bank</a:t>
             </a:r>
             <a:endParaRPr lang="en-US" dirty="0"/>
           </a:p>

</xml_diff>

<commit_message>
Establishing more of the finished app
</commit_message>
<xml_diff>
--- a/BankingPresentation.pptx
+++ b/BankingPresentation.pptx
@@ -208,7 +208,7 @@
           <a:effectLst/>
           <a:extLst>
             <a:ext uri="{91240B29-F687-4f45-9708-019B960494DF}">
-              <a14:hiddenLine xmlns="" xmlns:a14="http://schemas.microsoft.com/office/drawing/2010/main" w="9525">
+              <a14:hiddenLine xmlns:a14="http://schemas.microsoft.com/office/drawing/2010/main" xmlns="" w="9525">
                 <a:solidFill>
                   <a:srgbClr val="000000"/>
                 </a:solidFill>
@@ -401,7 +401,7 @@
             <a:fld id="{08B9EBBA-996F-894A-B54A-D6246ED52CEA}" type="datetimeFigureOut">
               <a:rPr lang="en-US" dirty="0"/>
               <a:pPr/>
-              <a:t>7/31/22</a:t>
+              <a:t>8/7/22</a:t>
             </a:fld>
             <a:endParaRPr lang="en-US" dirty="0"/>
           </a:p>
@@ -716,7 +716,7 @@
             <a:fld id="{18C79C5D-2A6F-F04D-97DA-BEF2467B64E4}" type="datetimeFigureOut">
               <a:rPr lang="en-US" dirty="0"/>
               <a:pPr/>
-              <a:t>7/31/22</a:t>
+              <a:t>8/7/22</a:t>
             </a:fld>
             <a:endParaRPr lang="en-US" dirty="0"/>
           </a:p>
@@ -1201,7 +1201,7 @@
             <a:fld id="{8DFA1846-DA80-1C48-A609-854EA85C59AD}" type="datetimeFigureOut">
               <a:rPr lang="en-US" dirty="0"/>
               <a:pPr/>
-              <a:t>7/31/22</a:t>
+              <a:t>8/7/22</a:t>
             </a:fld>
             <a:endParaRPr lang="en-US" dirty="0"/>
           </a:p>
@@ -1567,7 +1567,7 @@
             <a:fld id="{FBF54567-0DE4-3F47-BF90-CB84690072F9}" type="datetimeFigureOut">
               <a:rPr lang="en-US" dirty="0"/>
               <a:pPr/>
-              <a:t>7/31/22</a:t>
+              <a:t>8/7/22</a:t>
             </a:fld>
             <a:endParaRPr lang="en-US" dirty="0"/>
           </a:p>
@@ -1718,7 +1718,7 @@
           <a:ln/>
           <a:extLst>
             <a:ext uri="{91240B29-F687-4f45-9708-019B960494DF}">
-              <a14:hiddenLine xmlns="" xmlns:a14="http://schemas.microsoft.com/office/drawing/2010/main" w="9525">
+              <a14:hiddenLine xmlns:a14="http://schemas.microsoft.com/office/drawing/2010/main" xmlns="" w="9525">
                 <a:solidFill>
                   <a:srgbClr val="000000"/>
                 </a:solidFill>
@@ -1837,7 +1837,7 @@
             <a:fld id="{C6C52C72-DE31-F449-A4ED-4C594FD91407}" type="datetimeFigureOut">
               <a:rPr lang="en-US" dirty="0"/>
               <a:pPr/>
-              <a:t>7/31/22</a:t>
+              <a:t>8/7/22</a:t>
             </a:fld>
             <a:endParaRPr lang="en-US" dirty="0"/>
           </a:p>
@@ -1990,7 +1990,7 @@
           <a:ln/>
           <a:extLst>
             <a:ext uri="{91240B29-F687-4f45-9708-019B960494DF}">
-              <a14:hiddenLine xmlns="" xmlns:a14="http://schemas.microsoft.com/office/drawing/2010/main" w="9525">
+              <a14:hiddenLine xmlns:a14="http://schemas.microsoft.com/office/drawing/2010/main" xmlns="" w="9525">
                 <a:solidFill>
                   <a:srgbClr val="000000"/>
                 </a:solidFill>
@@ -2119,7 +2119,7 @@
             <a:fld id="{ED62726E-379B-B349-9EED-81ED093FA806}" type="datetimeFigureOut">
               <a:rPr lang="en-US" dirty="0"/>
               <a:pPr/>
-              <a:t>7/31/22</a:t>
+              <a:t>8/7/22</a:t>
             </a:fld>
             <a:endParaRPr lang="en-US" dirty="0"/>
           </a:p>
@@ -2270,7 +2270,7 @@
           <a:ln/>
           <a:extLst>
             <a:ext uri="{91240B29-F687-4f45-9708-019B960494DF}">
-              <a14:hiddenLine xmlns="" xmlns:a14="http://schemas.microsoft.com/office/drawing/2010/main" w="9525">
+              <a14:hiddenLine xmlns:a14="http://schemas.microsoft.com/office/drawing/2010/main" xmlns="" w="9525">
                 <a:solidFill>
                   <a:srgbClr val="000000"/>
                 </a:solidFill>
@@ -2399,7 +2399,7 @@
             <a:fld id="{9B3A1323-8D79-1946-B0D7-40001CF92E9D}" type="datetimeFigureOut">
               <a:rPr lang="en-US" dirty="0"/>
               <a:pPr/>
-              <a:t>7/31/22</a:t>
+              <a:t>8/7/22</a:t>
             </a:fld>
             <a:endParaRPr lang="en-US" dirty="0"/>
           </a:p>
@@ -2739,7 +2739,7 @@
             <a:fld id="{8DFA1846-DA80-1C48-A609-854EA85C59AD}" type="datetimeFigureOut">
               <a:rPr lang="en-US" dirty="0"/>
               <a:pPr/>
-              <a:t>7/31/22</a:t>
+              <a:t>8/7/22</a:t>
             </a:fld>
             <a:endParaRPr lang="en-US" dirty="0"/>
           </a:p>
@@ -2890,7 +2890,7 @@
           <a:ln/>
           <a:extLst>
             <a:ext uri="{91240B29-F687-4f45-9708-019B960494DF}">
-              <a14:hiddenLine xmlns="" xmlns:a14="http://schemas.microsoft.com/office/drawing/2010/main" w="9525">
+              <a14:hiddenLine xmlns:a14="http://schemas.microsoft.com/office/drawing/2010/main" xmlns="" w="9525">
                 <a:solidFill>
                   <a:srgbClr val="000000"/>
                 </a:solidFill>
@@ -3075,7 +3075,7 @@
             <a:fld id="{57302355-E14B-8545-A8F8-0FE83CC9D524}" type="datetimeFigureOut">
               <a:rPr lang="en-US" dirty="0"/>
               <a:pPr/>
-              <a:t>7/31/22</a:t>
+              <a:t>8/7/22</a:t>
             </a:fld>
             <a:endParaRPr lang="en-US" dirty="0"/>
           </a:p>
@@ -3226,7 +3226,7 @@
           <a:ln/>
           <a:extLst>
             <a:ext uri="{91240B29-F687-4f45-9708-019B960494DF}">
-              <a14:hiddenLine xmlns="" xmlns:a14="http://schemas.microsoft.com/office/drawing/2010/main" w="9525">
+              <a14:hiddenLine xmlns:a14="http://schemas.microsoft.com/office/drawing/2010/main" xmlns="" w="9525">
                 <a:solidFill>
                   <a:srgbClr val="000000"/>
                 </a:solidFill>
@@ -3549,7 +3549,7 @@
             <a:fld id="{02640F58-564D-2B4F-AE67-E407BA4FCF45}" type="datetimeFigureOut">
               <a:rPr lang="en-US" dirty="0"/>
               <a:pPr/>
-              <a:t>7/31/22</a:t>
+              <a:t>8/7/22</a:t>
             </a:fld>
             <a:endParaRPr lang="en-US" dirty="0"/>
           </a:p>
@@ -3700,7 +3700,7 @@
           <a:ln/>
           <a:extLst>
             <a:ext uri="{91240B29-F687-4f45-9708-019B960494DF}">
-              <a14:hiddenLine xmlns="" xmlns:a14="http://schemas.microsoft.com/office/drawing/2010/main" w="9525">
+              <a14:hiddenLine xmlns:a14="http://schemas.microsoft.com/office/drawing/2010/main" xmlns="" w="9525">
                 <a:solidFill>
                   <a:srgbClr val="000000"/>
                 </a:solidFill>
@@ -3767,7 +3767,7 @@
             <a:fld id="{F13A34C8-038E-2045-AF43-DF7DBB8E0E9E}" type="datetimeFigureOut">
               <a:rPr lang="en-US" dirty="0"/>
               <a:pPr/>
-              <a:t>7/31/22</a:t>
+              <a:t>8/7/22</a:t>
             </a:fld>
             <a:endParaRPr lang="en-US" dirty="0"/>
           </a:p>
@@ -3859,7 +3859,7 @@
             <a:fld id="{8818C68F-D26B-8F47-958C-23B49CF8A634}" type="datetimeFigureOut">
               <a:rPr lang="en-US" dirty="0"/>
               <a:pPr/>
-              <a:t>7/31/22</a:t>
+              <a:t>8/7/22</a:t>
             </a:fld>
             <a:endParaRPr lang="en-US" dirty="0"/>
           </a:p>
@@ -4123,7 +4123,7 @@
           <a:ln/>
           <a:extLst>
             <a:ext uri="{91240B29-F687-4f45-9708-019B960494DF}">
-              <a14:hiddenLine xmlns="" xmlns:a14="http://schemas.microsoft.com/office/drawing/2010/main" w="9525">
+              <a14:hiddenLine xmlns:a14="http://schemas.microsoft.com/office/drawing/2010/main" xmlns="" w="9525">
                 <a:solidFill>
                   <a:srgbClr val="000000"/>
                 </a:solidFill>
@@ -4323,7 +4323,7 @@
             <a:fld id="{D0DF5E60-9974-AC48-9591-99C2BB44B7CF}" type="datetimeFigureOut">
               <a:rPr lang="en-US" dirty="0"/>
               <a:pPr/>
-              <a:t>7/31/22</a:t>
+              <a:t>8/7/22</a:t>
             </a:fld>
             <a:endParaRPr lang="en-US" dirty="0"/>
           </a:p>
@@ -4633,7 +4633,7 @@
             <a:fld id="{18C79C5D-2A6F-F04D-97DA-BEF2467B64E4}" type="datetimeFigureOut">
               <a:rPr lang="en-US" dirty="0"/>
               <a:pPr/>
-              <a:t>7/31/22</a:t>
+              <a:t>8/7/22</a:t>
             </a:fld>
             <a:endParaRPr lang="en-US" dirty="0"/>
           </a:p>
@@ -4900,7 +4900,7 @@
             <a:fld id="{09B482E8-6E0E-1B4F-B1FD-C69DB9E858D9}" type="datetimeFigureOut">
               <a:rPr lang="en-US" dirty="0"/>
               <a:pPr/>
-              <a:t>7/31/22</a:t>
+              <a:t>8/7/22</a:t>
             </a:fld>
             <a:endParaRPr lang="en-US" dirty="0"/>
           </a:p>
@@ -5675,6 +5675,41 @@
           </a:p>
         </p:txBody>
       </p:sp>
+      <p:sp>
+        <p:nvSpPr>
+          <p:cNvPr id="5" name="TextBox 4">
+            <a:extLst>
+              <a:ext uri="{FF2B5EF4-FFF2-40B4-BE49-F238E27FC236}">
+                <a16:creationId xmlns:a16="http://schemas.microsoft.com/office/drawing/2014/main" id="{3BD24899-9BB1-C379-B3FA-558D42FA897A}"/>
+              </a:ext>
+            </a:extLst>
+          </p:cNvPr>
+          <p:cNvSpPr txBox="1"/>
+          <p:nvPr/>
+        </p:nvSpPr>
+        <p:spPr>
+          <a:xfrm rot="18607008">
+            <a:off x="8935268" y="3664396"/>
+            <a:ext cx="787395" cy="369332"/>
+          </a:xfrm>
+          <a:prstGeom prst="rect">
+            <a:avLst/>
+          </a:prstGeom>
+          <a:noFill/>
+        </p:spPr>
+        <p:txBody>
+          <a:bodyPr wrap="none" rtlCol="0">
+            <a:spAutoFit/>
+          </a:bodyPr>
+          <a:lstStyle/>
+          <a:p>
+            <a:r>
+              <a:rPr lang="en-US" dirty="0"/>
+              <a:t>JDBC</a:t>
+            </a:r>
+          </a:p>
+        </p:txBody>
+      </p:sp>
     </p:spTree>
     <p:extLst>
       <p:ext uri="{BB962C8B-B14F-4D97-AF65-F5344CB8AC3E}">

</xml_diff>

<commit_message>
user registration at basic implementation, demo is ready
</commit_message>
<xml_diff>
--- a/BankingPresentation.pptx
+++ b/BankingPresentation.pptx
@@ -208,7 +208,7 @@
           <a:effectLst/>
           <a:extLst>
             <a:ext uri="{91240B29-F687-4f45-9708-019B960494DF}">
-              <a14:hiddenLine xmlns:a14="http://schemas.microsoft.com/office/drawing/2010/main" xmlns="" w="9525">
+              <a14:hiddenLine xmlns="" xmlns:a14="http://schemas.microsoft.com/office/drawing/2010/main" w="9525">
                 <a:solidFill>
                   <a:srgbClr val="000000"/>
                 </a:solidFill>
@@ -401,7 +401,7 @@
             <a:fld id="{08B9EBBA-996F-894A-B54A-D6246ED52CEA}" type="datetimeFigureOut">
               <a:rPr lang="en-US" dirty="0"/>
               <a:pPr/>
-              <a:t>8/7/22</a:t>
+              <a:t>8/10/22</a:t>
             </a:fld>
             <a:endParaRPr lang="en-US" dirty="0"/>
           </a:p>
@@ -716,7 +716,7 @@
             <a:fld id="{18C79C5D-2A6F-F04D-97DA-BEF2467B64E4}" type="datetimeFigureOut">
               <a:rPr lang="en-US" dirty="0"/>
               <a:pPr/>
-              <a:t>8/7/22</a:t>
+              <a:t>8/10/22</a:t>
             </a:fld>
             <a:endParaRPr lang="en-US" dirty="0"/>
           </a:p>
@@ -1201,7 +1201,7 @@
             <a:fld id="{8DFA1846-DA80-1C48-A609-854EA85C59AD}" type="datetimeFigureOut">
               <a:rPr lang="en-US" dirty="0"/>
               <a:pPr/>
-              <a:t>8/7/22</a:t>
+              <a:t>8/10/22</a:t>
             </a:fld>
             <a:endParaRPr lang="en-US" dirty="0"/>
           </a:p>
@@ -1567,7 +1567,7 @@
             <a:fld id="{FBF54567-0DE4-3F47-BF90-CB84690072F9}" type="datetimeFigureOut">
               <a:rPr lang="en-US" dirty="0"/>
               <a:pPr/>
-              <a:t>8/7/22</a:t>
+              <a:t>8/10/22</a:t>
             </a:fld>
             <a:endParaRPr lang="en-US" dirty="0"/>
           </a:p>
@@ -1718,7 +1718,7 @@
           <a:ln/>
           <a:extLst>
             <a:ext uri="{91240B29-F687-4f45-9708-019B960494DF}">
-              <a14:hiddenLine xmlns:a14="http://schemas.microsoft.com/office/drawing/2010/main" xmlns="" w="9525">
+              <a14:hiddenLine xmlns="" xmlns:a14="http://schemas.microsoft.com/office/drawing/2010/main" w="9525">
                 <a:solidFill>
                   <a:srgbClr val="000000"/>
                 </a:solidFill>
@@ -1837,7 +1837,7 @@
             <a:fld id="{C6C52C72-DE31-F449-A4ED-4C594FD91407}" type="datetimeFigureOut">
               <a:rPr lang="en-US" dirty="0"/>
               <a:pPr/>
-              <a:t>8/7/22</a:t>
+              <a:t>8/10/22</a:t>
             </a:fld>
             <a:endParaRPr lang="en-US" dirty="0"/>
           </a:p>
@@ -1990,7 +1990,7 @@
           <a:ln/>
           <a:extLst>
             <a:ext uri="{91240B29-F687-4f45-9708-019B960494DF}">
-              <a14:hiddenLine xmlns:a14="http://schemas.microsoft.com/office/drawing/2010/main" xmlns="" w="9525">
+              <a14:hiddenLine xmlns="" xmlns:a14="http://schemas.microsoft.com/office/drawing/2010/main" w="9525">
                 <a:solidFill>
                   <a:srgbClr val="000000"/>
                 </a:solidFill>
@@ -2119,7 +2119,7 @@
             <a:fld id="{ED62726E-379B-B349-9EED-81ED093FA806}" type="datetimeFigureOut">
               <a:rPr lang="en-US" dirty="0"/>
               <a:pPr/>
-              <a:t>8/7/22</a:t>
+              <a:t>8/10/22</a:t>
             </a:fld>
             <a:endParaRPr lang="en-US" dirty="0"/>
           </a:p>
@@ -2270,7 +2270,7 @@
           <a:ln/>
           <a:extLst>
             <a:ext uri="{91240B29-F687-4f45-9708-019B960494DF}">
-              <a14:hiddenLine xmlns:a14="http://schemas.microsoft.com/office/drawing/2010/main" xmlns="" w="9525">
+              <a14:hiddenLine xmlns="" xmlns:a14="http://schemas.microsoft.com/office/drawing/2010/main" w="9525">
                 <a:solidFill>
                   <a:srgbClr val="000000"/>
                 </a:solidFill>
@@ -2399,7 +2399,7 @@
             <a:fld id="{9B3A1323-8D79-1946-B0D7-40001CF92E9D}" type="datetimeFigureOut">
               <a:rPr lang="en-US" dirty="0"/>
               <a:pPr/>
-              <a:t>8/7/22</a:t>
+              <a:t>8/10/22</a:t>
             </a:fld>
             <a:endParaRPr lang="en-US" dirty="0"/>
           </a:p>
@@ -2739,7 +2739,7 @@
             <a:fld id="{8DFA1846-DA80-1C48-A609-854EA85C59AD}" type="datetimeFigureOut">
               <a:rPr lang="en-US" dirty="0"/>
               <a:pPr/>
-              <a:t>8/7/22</a:t>
+              <a:t>8/10/22</a:t>
             </a:fld>
             <a:endParaRPr lang="en-US" dirty="0"/>
           </a:p>
@@ -2890,7 +2890,7 @@
           <a:ln/>
           <a:extLst>
             <a:ext uri="{91240B29-F687-4f45-9708-019B960494DF}">
-              <a14:hiddenLine xmlns:a14="http://schemas.microsoft.com/office/drawing/2010/main" xmlns="" w="9525">
+              <a14:hiddenLine xmlns="" xmlns:a14="http://schemas.microsoft.com/office/drawing/2010/main" w="9525">
                 <a:solidFill>
                   <a:srgbClr val="000000"/>
                 </a:solidFill>
@@ -3075,7 +3075,7 @@
             <a:fld id="{57302355-E14B-8545-A8F8-0FE83CC9D524}" type="datetimeFigureOut">
               <a:rPr lang="en-US" dirty="0"/>
               <a:pPr/>
-              <a:t>8/7/22</a:t>
+              <a:t>8/10/22</a:t>
             </a:fld>
             <a:endParaRPr lang="en-US" dirty="0"/>
           </a:p>
@@ -3226,7 +3226,7 @@
           <a:ln/>
           <a:extLst>
             <a:ext uri="{91240B29-F687-4f45-9708-019B960494DF}">
-              <a14:hiddenLine xmlns:a14="http://schemas.microsoft.com/office/drawing/2010/main" xmlns="" w="9525">
+              <a14:hiddenLine xmlns="" xmlns:a14="http://schemas.microsoft.com/office/drawing/2010/main" w="9525">
                 <a:solidFill>
                   <a:srgbClr val="000000"/>
                 </a:solidFill>
@@ -3549,7 +3549,7 @@
             <a:fld id="{02640F58-564D-2B4F-AE67-E407BA4FCF45}" type="datetimeFigureOut">
               <a:rPr lang="en-US" dirty="0"/>
               <a:pPr/>
-              <a:t>8/7/22</a:t>
+              <a:t>8/10/22</a:t>
             </a:fld>
             <a:endParaRPr lang="en-US" dirty="0"/>
           </a:p>
@@ -3700,7 +3700,7 @@
           <a:ln/>
           <a:extLst>
             <a:ext uri="{91240B29-F687-4f45-9708-019B960494DF}">
-              <a14:hiddenLine xmlns:a14="http://schemas.microsoft.com/office/drawing/2010/main" xmlns="" w="9525">
+              <a14:hiddenLine xmlns="" xmlns:a14="http://schemas.microsoft.com/office/drawing/2010/main" w="9525">
                 <a:solidFill>
                   <a:srgbClr val="000000"/>
                 </a:solidFill>
@@ -3767,7 +3767,7 @@
             <a:fld id="{F13A34C8-038E-2045-AF43-DF7DBB8E0E9E}" type="datetimeFigureOut">
               <a:rPr lang="en-US" dirty="0"/>
               <a:pPr/>
-              <a:t>8/7/22</a:t>
+              <a:t>8/10/22</a:t>
             </a:fld>
             <a:endParaRPr lang="en-US" dirty="0"/>
           </a:p>
@@ -3859,7 +3859,7 @@
             <a:fld id="{8818C68F-D26B-8F47-958C-23B49CF8A634}" type="datetimeFigureOut">
               <a:rPr lang="en-US" dirty="0"/>
               <a:pPr/>
-              <a:t>8/7/22</a:t>
+              <a:t>8/10/22</a:t>
             </a:fld>
             <a:endParaRPr lang="en-US" dirty="0"/>
           </a:p>
@@ -4123,7 +4123,7 @@
           <a:ln/>
           <a:extLst>
             <a:ext uri="{91240B29-F687-4f45-9708-019B960494DF}">
-              <a14:hiddenLine xmlns:a14="http://schemas.microsoft.com/office/drawing/2010/main" xmlns="" w="9525">
+              <a14:hiddenLine xmlns="" xmlns:a14="http://schemas.microsoft.com/office/drawing/2010/main" w="9525">
                 <a:solidFill>
                   <a:srgbClr val="000000"/>
                 </a:solidFill>
@@ -4323,7 +4323,7 @@
             <a:fld id="{D0DF5E60-9974-AC48-9591-99C2BB44B7CF}" type="datetimeFigureOut">
               <a:rPr lang="en-US" dirty="0"/>
               <a:pPr/>
-              <a:t>8/7/22</a:t>
+              <a:t>8/10/22</a:t>
             </a:fld>
             <a:endParaRPr lang="en-US" dirty="0"/>
           </a:p>
@@ -4633,7 +4633,7 @@
             <a:fld id="{18C79C5D-2A6F-F04D-97DA-BEF2467B64E4}" type="datetimeFigureOut">
               <a:rPr lang="en-US" dirty="0"/>
               <a:pPr/>
-              <a:t>8/7/22</a:t>
+              <a:t>8/10/22</a:t>
             </a:fld>
             <a:endParaRPr lang="en-US" dirty="0"/>
           </a:p>
@@ -4900,7 +4900,7 @@
             <a:fld id="{09B482E8-6E0E-1B4F-B1FD-C69DB9E858D9}" type="datetimeFigureOut">
               <a:rPr lang="en-US" dirty="0"/>
               <a:pPr/>
-              <a:t>8/7/22</a:t>
+              <a:t>8/10/22</a:t>
             </a:fld>
             <a:endParaRPr lang="en-US" dirty="0"/>
           </a:p>
@@ -5488,7 +5488,7 @@
           <a:p>
             <a:r>
               <a:rPr lang="en-US" dirty="0"/>
-              <a:t>MySQL Workbench Which communicates with my local </a:t>
+              <a:t>AWS RDS relational database which communicates with my local </a:t>
             </a:r>
           </a:p>
           <a:p>
@@ -5514,13 +5514,14 @@
             </a:r>
             <a:r>
               <a:rPr lang="en-US" dirty="0"/>
-              <a:t> &amp; </a:t>
-            </a:r>
-            <a:r>
-              <a:rPr lang="en-US"/>
-              <a:t>Scanner functionality. </a:t>
-            </a:r>
-            <a:endParaRPr lang="en-US" dirty="0"/>
+              <a:t> &amp; Scanner functionality. (Coming Soon)</a:t>
+            </a:r>
+          </a:p>
+          <a:p>
+            <a:r>
+              <a:rPr lang="en-US" dirty="0"/>
+              <a:t>Dependency tech is Maven &amp; SQL implementation is PostgreSQL</a:t>
+            </a:r>
           </a:p>
         </p:txBody>
       </p:sp>
@@ -5538,7 +5539,7 @@
         </p:nvSpPr>
         <p:spPr>
           <a:xfrm>
-            <a:off x="8118088" y="4070195"/>
+            <a:off x="7872762" y="5465704"/>
             <a:ext cx="1070517" cy="1024773"/>
           </a:xfrm>
           <a:prstGeom prst="flowChartMagneticDisk">
@@ -5589,13 +5590,15 @@
               </a:ext>
             </a:extLst>
           </p:cNvPr>
-          <p:cNvCxnSpPr/>
+          <p:cNvCxnSpPr>
+            <a:cxnSpLocks/>
+          </p:cNvCxnSpPr>
           <p:nvPr/>
         </p:nvCxnSpPr>
         <p:spPr>
-          <a:xfrm flipV="1">
-            <a:off x="9188605" y="3557239"/>
-            <a:ext cx="557561" cy="680224"/>
+          <a:xfrm flipH="1">
+            <a:off x="8790242" y="5003631"/>
+            <a:ext cx="811734" cy="862264"/>
           </a:xfrm>
           <a:prstGeom prst="straightConnector1">
             <a:avLst/>
@@ -5633,7 +5636,7 @@
         </p:nvSpPr>
         <p:spPr>
           <a:xfrm>
-            <a:off x="9612351" y="2687444"/>
+            <a:off x="9367025" y="4082953"/>
             <a:ext cx="1650381" cy="1037063"/>
           </a:xfrm>
           <a:prstGeom prst="flowChartProcess">
@@ -5689,7 +5692,7 @@
         </p:nvSpPr>
         <p:spPr>
           <a:xfrm rot="18607008">
-            <a:off x="8935268" y="3664396"/>
+            <a:off x="8712062" y="5146298"/>
             <a:ext cx="787395" cy="369332"/>
           </a:xfrm>
           <a:prstGeom prst="rect">

</xml_diff>